<commit_message>
modified to real links on github
</commit_message>
<xml_diff>
--- a/architecture/modularity/modularity.pptx
+++ b/architecture/modularity/modularity.pptx
@@ -203,7 +203,7 @@
             <a:fld id="{186736A9-3899-4DA5-ABAE-EA9F8347A7D0}" type="datetimeFigureOut">
               <a:rPr lang="sk-SK" smtClean="0"/>
               <a:pPr/>
-              <a:t>17. 6. 2012</a:t>
+              <a:t>18. 6. 2012</a:t>
             </a:fld>
             <a:endParaRPr lang="sk-SK"/>
           </a:p>
@@ -1553,7 +1553,7 @@
             <a:fld id="{6A812B65-9A1B-42FF-8DDA-365A2B0950AF}" type="datetimeFigureOut">
               <a:rPr lang="sk-SK" smtClean="0"/>
               <a:pPr/>
-              <a:t>17. 6. 2012</a:t>
+              <a:t>18. 6. 2012</a:t>
             </a:fld>
             <a:endParaRPr lang="sk-SK"/>
           </a:p>
@@ -1720,7 +1720,7 @@
             <a:fld id="{6A812B65-9A1B-42FF-8DDA-365A2B0950AF}" type="datetimeFigureOut">
               <a:rPr lang="sk-SK" smtClean="0"/>
               <a:pPr/>
-              <a:t>17. 6. 2012</a:t>
+              <a:t>18. 6. 2012</a:t>
             </a:fld>
             <a:endParaRPr lang="sk-SK"/>
           </a:p>
@@ -1897,7 +1897,7 @@
             <a:fld id="{6A812B65-9A1B-42FF-8DDA-365A2B0950AF}" type="datetimeFigureOut">
               <a:rPr lang="sk-SK" smtClean="0"/>
               <a:pPr/>
-              <a:t>17. 6. 2012</a:t>
+              <a:t>18. 6. 2012</a:t>
             </a:fld>
             <a:endParaRPr lang="sk-SK"/>
           </a:p>
@@ -2064,7 +2064,7 @@
             <a:fld id="{6A812B65-9A1B-42FF-8DDA-365A2B0950AF}" type="datetimeFigureOut">
               <a:rPr lang="sk-SK" smtClean="0"/>
               <a:pPr/>
-              <a:t>17. 6. 2012</a:t>
+              <a:t>18. 6. 2012</a:t>
             </a:fld>
             <a:endParaRPr lang="sk-SK"/>
           </a:p>
@@ -2307,7 +2307,7 @@
             <a:fld id="{6A812B65-9A1B-42FF-8DDA-365A2B0950AF}" type="datetimeFigureOut">
               <a:rPr lang="sk-SK" smtClean="0"/>
               <a:pPr/>
-              <a:t>17. 6. 2012</a:t>
+              <a:t>18. 6. 2012</a:t>
             </a:fld>
             <a:endParaRPr lang="sk-SK"/>
           </a:p>
@@ -2592,7 +2592,7 @@
             <a:fld id="{6A812B65-9A1B-42FF-8DDA-365A2B0950AF}" type="datetimeFigureOut">
               <a:rPr lang="sk-SK" smtClean="0"/>
               <a:pPr/>
-              <a:t>17. 6. 2012</a:t>
+              <a:t>18. 6. 2012</a:t>
             </a:fld>
             <a:endParaRPr lang="sk-SK"/>
           </a:p>
@@ -3011,7 +3011,7 @@
             <a:fld id="{6A812B65-9A1B-42FF-8DDA-365A2B0950AF}" type="datetimeFigureOut">
               <a:rPr lang="sk-SK" smtClean="0"/>
               <a:pPr/>
-              <a:t>17. 6. 2012</a:t>
+              <a:t>18. 6. 2012</a:t>
             </a:fld>
             <a:endParaRPr lang="sk-SK"/>
           </a:p>
@@ -3126,7 +3126,7 @@
             <a:fld id="{6A812B65-9A1B-42FF-8DDA-365A2B0950AF}" type="datetimeFigureOut">
               <a:rPr lang="sk-SK" smtClean="0"/>
               <a:pPr/>
-              <a:t>17. 6. 2012</a:t>
+              <a:t>18. 6. 2012</a:t>
             </a:fld>
             <a:endParaRPr lang="sk-SK"/>
           </a:p>
@@ -3218,7 +3218,7 @@
             <a:fld id="{6A812B65-9A1B-42FF-8DDA-365A2B0950AF}" type="datetimeFigureOut">
               <a:rPr lang="sk-SK" smtClean="0"/>
               <a:pPr/>
-              <a:t>17. 6. 2012</a:t>
+              <a:t>18. 6. 2012</a:t>
             </a:fld>
             <a:endParaRPr lang="sk-SK"/>
           </a:p>
@@ -3492,7 +3492,7 @@
             <a:fld id="{6A812B65-9A1B-42FF-8DDA-365A2B0950AF}" type="datetimeFigureOut">
               <a:rPr lang="sk-SK" smtClean="0"/>
               <a:pPr/>
-              <a:t>17. 6. 2012</a:t>
+              <a:t>18. 6. 2012</a:t>
             </a:fld>
             <a:endParaRPr lang="sk-SK"/>
           </a:p>
@@ -3742,7 +3742,7 @@
             <a:fld id="{6A812B65-9A1B-42FF-8DDA-365A2B0950AF}" type="datetimeFigureOut">
               <a:rPr lang="sk-SK" smtClean="0"/>
               <a:pPr/>
-              <a:t>17. 6. 2012</a:t>
+              <a:t>18. 6. 2012</a:t>
             </a:fld>
             <a:endParaRPr lang="sk-SK"/>
           </a:p>
@@ -3952,7 +3952,7 @@
             <a:fld id="{6A812B65-9A1B-42FF-8DDA-365A2B0950AF}" type="datetimeFigureOut">
               <a:rPr lang="sk-SK" smtClean="0"/>
               <a:pPr/>
-              <a:t>17. 6. 2012</a:t>
+              <a:t>18. 6. 2012</a:t>
             </a:fld>
             <a:endParaRPr lang="sk-SK"/>
           </a:p>
@@ -4356,9 +4356,16 @@
             <p:ph type="subTitle" idx="1"/>
           </p:nvPr>
         </p:nvSpPr>
-        <p:spPr/>
-        <p:txBody>
-          <a:bodyPr/>
+        <p:spPr>
+          <a:xfrm>
+            <a:off x="990600" y="3886200"/>
+            <a:ext cx="7391400" cy="1752600"/>
+          </a:xfrm>
+        </p:spPr>
+        <p:txBody>
+          <a:bodyPr>
+            <a:normAutofit fontScale="92500"/>
+          </a:bodyPr>
           <a:lstStyle/>
           <a:p>
             <a:pPr algn="l"/>
@@ -4414,8 +4421,18 @@
                 <a:solidFill>
                   <a:srgbClr val="FF0000"/>
                 </a:solidFill>
+                <a:hlinkClick r:id="rId3"/>
               </a:rPr>
-              <a:t>http://github.com/Tibor17/maven</a:t>
+              <a:t>https://</a:t>
+            </a:r>
+            <a:r>
+              <a:rPr lang="sk-SK" sz="2000" dirty="0" smtClean="0">
+                <a:solidFill>
+                  <a:srgbClr val="FF0000"/>
+                </a:solidFill>
+                <a:hlinkClick r:id="rId3"/>
+              </a:rPr>
+              <a:t>github.com/Tibor17/maven/tree/master/architecture/modularity</a:t>
             </a:r>
             <a:r>
               <a:rPr lang="en-US" sz="2000" dirty="0" smtClean="0">
@@ -4423,7 +4440,7 @@
                   <a:srgbClr val="FF0000"/>
                 </a:solidFill>
               </a:rPr>
-              <a:t>/architecture/modularity</a:t>
+              <a:t> </a:t>
             </a:r>
             <a:endParaRPr lang="sk-SK" sz="2000" dirty="0">
               <a:solidFill>
@@ -4687,13 +4704,8 @@
           <a:p>
             <a:r>
               <a:rPr lang="en-US" dirty="0" smtClean="0"/>
-              <a:t>Dependencies </a:t>
-            </a:r>
-            <a:r>
-              <a:rPr lang="en-US" dirty="0" smtClean="0"/>
-              <a:t>Management</a:t>
-            </a:r>
-            <a:endParaRPr lang="en-US" dirty="0" smtClean="0"/>
+              <a:t>Dependencies Management</a:t>
+            </a:r>
           </a:p>
           <a:p>
             <a:r>

</xml_diff>